<commit_message>
Add CW21, fix typos
</commit_message>
<xml_diff>
--- a/assets/img/CW20.pptx
+++ b/assets/img/CW20.pptx
@@ -104,6 +104,11 @@
       </a:defRPr>
     </a:lvl9pPr>
   </p:defaultTextStyle>
+  <p:extLst>
+    <p:ext uri="{EFAFB233-063F-42B5-8137-9DF3F51BA10A}">
+      <p15:sldGuideLst xmlns:p15="http://schemas.microsoft.com/office/powerpoint/2012/main"/>
+    </p:ext>
+  </p:extLst>
 </p:presentation>
 </file>
 
@@ -576,7 +581,7 @@
           <a:p>
             <a:fld id="{EA0C0817-A112-4847-8014-A94B7D2A4EA3}" type="datetime1">
               <a:rPr lang="en-US" smtClean="0"/>
-              <a:t>5/23/20</a:t>
+              <a:t>4/2/21</a:t>
             </a:fld>
             <a:endParaRPr lang="en-US" dirty="0"/>
           </a:p>
@@ -778,7 +783,7 @@
           <a:p>
             <a:fld id="{134F40B7-36AB-4376-BE14-EF7004D79BB9}" type="datetime1">
               <a:rPr lang="en-US" smtClean="0"/>
-              <a:t>5/23/20</a:t>
+              <a:t>4/2/21</a:t>
             </a:fld>
             <a:endParaRPr lang="en-US"/>
           </a:p>
@@ -958,7 +963,7 @@
           <a:p>
             <a:fld id="{FF87CAB8-DCAE-46A5-AADA-B3FAD11A54E0}" type="datetime1">
               <a:rPr lang="en-US" smtClean="0"/>
-              <a:t>5/23/20</a:t>
+              <a:t>4/2/21</a:t>
             </a:fld>
             <a:endParaRPr lang="en-US"/>
           </a:p>
@@ -1128,7 +1133,7 @@
           <a:p>
             <a:fld id="{7332B432-ACDA-4023-A761-2BAB76577B62}" type="datetime1">
               <a:rPr lang="en-US" smtClean="0"/>
-              <a:t>5/23/20</a:t>
+              <a:t>4/2/21</a:t>
             </a:fld>
             <a:endParaRPr lang="en-US"/>
           </a:p>
@@ -1727,7 +1732,7 @@
           <a:p>
             <a:fld id="{D9C646AA-F36E-4540-911D-FFFC0A0EF24A}" type="datetime1">
               <a:rPr lang="en-US" smtClean="0"/>
-              <a:t>5/23/20</a:t>
+              <a:t>4/2/21</a:t>
             </a:fld>
             <a:endParaRPr lang="en-US" dirty="0"/>
           </a:p>
@@ -2047,7 +2052,7 @@
           <a:p>
             <a:fld id="{69186D26-FA5F-4637-B602-B7C2DC34CFD4}" type="datetime1">
               <a:rPr lang="en-US" smtClean="0"/>
-              <a:t>5/23/20</a:t>
+              <a:t>4/2/21</a:t>
             </a:fld>
             <a:endParaRPr lang="en-US"/>
           </a:p>
@@ -2482,7 +2487,7 @@
           <a:p>
             <a:fld id="{8A7F15D8-96D1-4781-BC50-CA8A088B2FE4}" type="datetime1">
               <a:rPr lang="en-US" smtClean="0"/>
-              <a:t>5/23/20</a:t>
+              <a:t>4/2/21</a:t>
             </a:fld>
             <a:endParaRPr lang="en-US"/>
           </a:p>
@@ -2600,7 +2605,7 @@
           <a:p>
             <a:fld id="{F9A96C99-B8F8-4528-BD05-0E16E943DC09}" type="datetime1">
               <a:rPr lang="en-US" smtClean="0"/>
-              <a:t>5/23/20</a:t>
+              <a:t>4/2/21</a:t>
             </a:fld>
             <a:endParaRPr lang="en-US"/>
           </a:p>
@@ -2695,7 +2700,7 @@
           <a:p>
             <a:fld id="{03636942-C211-4B28-8DBD-C953E00AF71B}" type="datetime1">
               <a:rPr lang="en-US" smtClean="0"/>
-              <a:t>5/23/20</a:t>
+              <a:t>4/2/21</a:t>
             </a:fld>
             <a:endParaRPr lang="en-US"/>
           </a:p>
@@ -3112,7 +3117,7 @@
           <a:p>
             <a:fld id="{7E8D12A6-918A-48BD-8CB9-CA713993B0EA}" type="datetime1">
               <a:rPr lang="en-US" smtClean="0"/>
-              <a:t>5/23/20</a:t>
+              <a:t>4/2/21</a:t>
             </a:fld>
             <a:endParaRPr lang="en-US"/>
           </a:p>
@@ -3374,7 +3379,7 @@
             <a:fld id="{E778CE86-875F-4587-BCF6-FA054AFC0D53}" type="datetime1">
               <a:rPr lang="en-US" smtClean="0"/>
               <a:pPr/>
-              <a:t>5/23/20</a:t>
+              <a:t>4/2/21</a:t>
             </a:fld>
             <a:endParaRPr lang="en-US" dirty="0"/>
           </a:p>
@@ -3890,7 +3895,7 @@
           <a:p>
             <a:fld id="{F6FA2B21-3FCD-4721-B95C-427943F61125}" type="datetime1">
               <a:rPr lang="en-US" smtClean="0"/>
-              <a:t>5/23/20</a:t>
+              <a:t>4/2/21</a:t>
             </a:fld>
             <a:endParaRPr lang="en-US"/>
           </a:p>
@@ -4735,7 +4740,7 @@
                   <a:schemeClr val="tx1"/>
                 </a:solidFill>
               </a:rPr>
-              <a:t>July 21 – 23, 2019</a:t>
+              <a:t>July 21 – 23, 2020</a:t>
             </a:r>
           </a:p>
         </p:txBody>

</xml_diff>